<commit_message>
add note on scattering types
</commit_message>
<xml_diff>
--- a/CSNS_March_2019/3_Wednesday_March_27th/3_sample_and_keyword_exercise/3_sample_practical_powders_sx.pptx
+++ b/CSNS_March_2019/3_Wednesday_March_27th/3_sample_and_keyword_exercise/3_sample_practical_powders_sx.pptx
@@ -13283,7 +13283,7 @@
       </p:grpSpPr>
       <p:sp>
         <p:nvSpPr>
-          <p:cNvPr id="275" name="CustomShape 1"/>
+          <p:cNvPr id="277" name="CustomShape 1"/>
           <p:cNvSpPr/>
           <p:nvPr/>
         </p:nvSpPr>
@@ -13309,7 +13309,7 @@
       </p:sp>
       <p:sp>
         <p:nvSpPr>
-          <p:cNvPr id="276" name="CustomShape 2"/>
+          <p:cNvPr id="278" name="CustomShape 2"/>
           <p:cNvSpPr/>
           <p:nvPr/>
         </p:nvSpPr>
@@ -13363,7 +13363,7 @@
       </p:sp>
       <p:sp>
         <p:nvSpPr>
-          <p:cNvPr id="277" name="CustomShape 3"/>
+          <p:cNvPr id="279" name="CustomShape 3"/>
           <p:cNvSpPr/>
           <p:nvPr/>
         </p:nvSpPr>
@@ -13594,7 +13594,7 @@
       </p:grpSpPr>
       <p:sp>
         <p:nvSpPr>
-          <p:cNvPr id="278" name="CustomShape 1"/>
+          <p:cNvPr id="280" name="CustomShape 1"/>
           <p:cNvSpPr/>
           <p:nvPr/>
         </p:nvSpPr>
@@ -13620,7 +13620,7 @@
       </p:sp>
       <p:sp>
         <p:nvSpPr>
-          <p:cNvPr id="279" name="CustomShape 2"/>
+          <p:cNvPr id="281" name="CustomShape 2"/>
           <p:cNvSpPr/>
           <p:nvPr/>
         </p:nvSpPr>
@@ -13674,7 +13674,7 @@
       </p:sp>
       <p:sp>
         <p:nvSpPr>
-          <p:cNvPr id="280" name="CustomShape 3"/>
+          <p:cNvPr id="282" name="CustomShape 3"/>
           <p:cNvSpPr/>
           <p:nvPr/>
         </p:nvSpPr>
@@ -14133,7 +14133,7 @@
       </p:sp>
       <p:pic>
         <p:nvPicPr>
-          <p:cNvPr id="281" name="image.jpeg" descr=""/>
+          <p:cNvPr id="283" name="image.jpeg" descr=""/>
           <p:cNvPicPr/>
           <p:nvPr/>
         </p:nvPicPr>
@@ -14213,7 +14213,7 @@
       </p:grpSpPr>
       <p:sp>
         <p:nvSpPr>
-          <p:cNvPr id="282" name="CustomShape 1"/>
+          <p:cNvPr id="284" name="CustomShape 1"/>
           <p:cNvSpPr/>
           <p:nvPr/>
         </p:nvSpPr>
@@ -14239,7 +14239,7 @@
       </p:sp>
       <p:sp>
         <p:nvSpPr>
-          <p:cNvPr id="283" name="CustomShape 2"/>
+          <p:cNvPr id="285" name="CustomShape 2"/>
           <p:cNvSpPr/>
           <p:nvPr/>
         </p:nvSpPr>
@@ -14293,7 +14293,7 @@
       </p:sp>
       <p:sp>
         <p:nvSpPr>
-          <p:cNvPr id="284" name="CustomShape 3"/>
+          <p:cNvPr id="286" name="CustomShape 3"/>
           <p:cNvSpPr/>
           <p:nvPr/>
         </p:nvSpPr>
@@ -14665,7 +14665,7 @@
       </p:grpSpPr>
       <p:sp>
         <p:nvSpPr>
-          <p:cNvPr id="285" name="CustomShape 1"/>
+          <p:cNvPr id="287" name="CustomShape 1"/>
           <p:cNvSpPr/>
           <p:nvPr/>
         </p:nvSpPr>
@@ -14691,7 +14691,7 @@
       </p:sp>
       <p:sp>
         <p:nvSpPr>
-          <p:cNvPr id="286" name="CustomShape 2"/>
+          <p:cNvPr id="288" name="CustomShape 2"/>
           <p:cNvSpPr/>
           <p:nvPr/>
         </p:nvSpPr>
@@ -14745,7 +14745,7 @@
       </p:sp>
       <p:sp>
         <p:nvSpPr>
-          <p:cNvPr id="287" name="CustomShape 3"/>
+          <p:cNvPr id="289" name="CustomShape 3"/>
           <p:cNvSpPr/>
           <p:nvPr/>
         </p:nvSpPr>
@@ -14973,7 +14973,7 @@
       </p:grpSpPr>
       <p:sp>
         <p:nvSpPr>
-          <p:cNvPr id="288" name="CustomShape 1"/>
+          <p:cNvPr id="290" name="CustomShape 1"/>
           <p:cNvSpPr/>
           <p:nvPr/>
         </p:nvSpPr>
@@ -14999,7 +14999,7 @@
       </p:sp>
       <p:sp>
         <p:nvSpPr>
-          <p:cNvPr id="289" name="CustomShape 2"/>
+          <p:cNvPr id="291" name="CustomShape 2"/>
           <p:cNvSpPr/>
           <p:nvPr/>
         </p:nvSpPr>
@@ -15064,7 +15064,7 @@
       </p:sp>
       <p:sp>
         <p:nvSpPr>
-          <p:cNvPr id="290" name="CustomShape 3"/>
+          <p:cNvPr id="292" name="CustomShape 3"/>
           <p:cNvSpPr/>
           <p:nvPr/>
         </p:nvSpPr>
@@ -15301,7 +15301,7 @@
       </p:grpSpPr>
       <p:sp>
         <p:nvSpPr>
-          <p:cNvPr id="291" name="CustomShape 1"/>
+          <p:cNvPr id="293" name="CustomShape 1"/>
           <p:cNvSpPr/>
           <p:nvPr/>
         </p:nvSpPr>
@@ -15327,7 +15327,7 @@
       </p:sp>
       <p:pic>
         <p:nvPicPr>
-          <p:cNvPr id="292" name="image.jpeg" descr=""/>
+          <p:cNvPr id="294" name="image.jpeg" descr=""/>
           <p:cNvPicPr/>
           <p:nvPr/>
         </p:nvPicPr>
@@ -15350,7 +15350,7 @@
       </p:pic>
       <p:grpSp>
         <p:nvGrpSpPr>
-          <p:cNvPr id="293" name="Group 2"/>
+          <p:cNvPr id="295" name="Group 2"/>
           <p:cNvGrpSpPr/>
           <p:nvPr/>
         </p:nvGrpSpPr>
@@ -15364,7 +15364,7 @@
         </p:grpSpPr>
         <p:sp>
           <p:nvSpPr>
-            <p:cNvPr id="294" name="CustomShape 3"/>
+            <p:cNvPr id="296" name="CustomShape 3"/>
             <p:cNvSpPr/>
             <p:nvPr/>
           </p:nvSpPr>
@@ -15392,7 +15392,7 @@
         </p:sp>
         <p:sp>
           <p:nvSpPr>
-            <p:cNvPr id="295" name="CustomShape 4"/>
+            <p:cNvPr id="297" name="CustomShape 4"/>
             <p:cNvSpPr/>
             <p:nvPr/>
           </p:nvSpPr>
@@ -15778,7 +15778,7 @@
       </p:grpSp>
       <p:sp>
         <p:nvSpPr>
-          <p:cNvPr id="296" name="CustomShape 5"/>
+          <p:cNvPr id="298" name="CustomShape 5"/>
           <p:cNvSpPr/>
           <p:nvPr/>
         </p:nvSpPr>
@@ -15889,7 +15889,7 @@
       </p:grpSpPr>
       <p:sp>
         <p:nvSpPr>
-          <p:cNvPr id="297" name="CustomShape 1"/>
+          <p:cNvPr id="299" name="CustomShape 1"/>
           <p:cNvSpPr/>
           <p:nvPr/>
         </p:nvSpPr>
@@ -15915,7 +15915,7 @@
       </p:sp>
       <p:pic>
         <p:nvPicPr>
-          <p:cNvPr id="298" name="image.jpeg" descr=""/>
+          <p:cNvPr id="300" name="image.jpeg" descr=""/>
           <p:cNvPicPr/>
           <p:nvPr/>
         </p:nvPicPr>
@@ -15938,7 +15938,7 @@
       </p:pic>
       <p:grpSp>
         <p:nvGrpSpPr>
-          <p:cNvPr id="299" name="Group 2"/>
+          <p:cNvPr id="301" name="Group 2"/>
           <p:cNvGrpSpPr/>
           <p:nvPr/>
         </p:nvGrpSpPr>
@@ -15952,7 +15952,7 @@
         </p:grpSpPr>
         <p:sp>
           <p:nvSpPr>
-            <p:cNvPr id="300" name="CustomShape 3"/>
+            <p:cNvPr id="302" name="CustomShape 3"/>
             <p:cNvSpPr/>
             <p:nvPr/>
           </p:nvSpPr>
@@ -15980,7 +15980,7 @@
         </p:sp>
         <p:sp>
           <p:nvSpPr>
-            <p:cNvPr id="301" name="CustomShape 4"/>
+            <p:cNvPr id="303" name="CustomShape 4"/>
             <p:cNvSpPr/>
             <p:nvPr/>
           </p:nvSpPr>
@@ -16139,7 +16139,7 @@
       </p:grpSp>
       <p:sp>
         <p:nvSpPr>
-          <p:cNvPr id="302" name="CustomShape 5"/>
+          <p:cNvPr id="304" name="CustomShape 5"/>
           <p:cNvSpPr/>
           <p:nvPr/>
         </p:nvSpPr>
@@ -19265,7 +19265,7 @@
         <p:spPr>
           <a:xfrm>
             <a:off x="5184360" y="763560"/>
-            <a:ext cx="6119640" cy="4478760"/>
+            <a:ext cx="6119640" cy="5027400"/>
           </a:xfrm>
           <a:prstGeom prst="rect">
             <a:avLst/>
@@ -19534,6 +19534,47 @@
               </a:buBlip>
             </a:pPr>
             <a:r>
+              <a:rPr b="0" i="1" lang="en-GB" sz="1800" spc="-1" strike="noStrike">
+                <a:solidFill>
+                  <a:srgbClr val="000000"/>
+                </a:solidFill>
+                <a:latin typeface="Arial"/>
+              </a:rPr>
+              <a:t>A current limitation in the </a:t>
+            </a:r>
+            <a:r>
+              <a:rPr b="1" i="1" lang="en-GB" sz="1800" spc="-1" strike="noStrike">
+                <a:solidFill>
+                  <a:srgbClr val="000000"/>
+                </a:solidFill>
+                <a:latin typeface="Courier New"/>
+              </a:rPr>
+              <a:t>WHEN</a:t>
+            </a:r>
+            <a:r>
+              <a:rPr b="0" i="1" lang="en-GB" sz="1800" spc="-1" strike="noStrike">
+                <a:solidFill>
+                  <a:srgbClr val="000000"/>
+                </a:solidFill>
+                <a:latin typeface="Arial"/>
+              </a:rPr>
+              <a:t> grammar makes it necessary to do it this way.</a:t>
+            </a:r>
+            <a:endParaRPr b="0" lang="en-GB" sz="1800" spc="-1" strike="noStrike">
+              <a:latin typeface="Arial"/>
+            </a:endParaRPr>
+          </a:p>
+          <a:p>
+            <a:pPr marL="216000" indent="-215640">
+              <a:lnSpc>
+                <a:spcPct val="100000"/>
+              </a:lnSpc>
+              <a:buSzPct val="100045"/>
+              <a:buBlip>
+                <a:blip r:embed="rId11"/>
+              </a:buBlip>
+            </a:pPr>
+            <a:r>
               <a:rPr b="0" lang="en-GB" sz="1800" spc="-1" strike="noStrike">
                 <a:solidFill>
                   <a:srgbClr val="000000"/>
@@ -19541,6 +19582,91 @@
                 <a:latin typeface="Arial"/>
               </a:rPr>
               <a:t>Think of a possible way to only monitor incoherent scattering… HINT: type==’i’ for incoherent</a:t>
+            </a:r>
+            <a:endParaRPr b="0" lang="en-GB" sz="1800" spc="-1" strike="noStrike">
+              <a:latin typeface="Arial"/>
+            </a:endParaRPr>
+          </a:p>
+        </p:txBody>
+      </p:sp>
+      <p:sp>
+        <p:nvSpPr>
+          <p:cNvPr id="272" name="TextShape 4"/>
+          <p:cNvSpPr txBox="1"/>
+          <p:nvPr/>
+        </p:nvSpPr>
+        <p:spPr>
+          <a:xfrm>
+            <a:off x="1356840" y="5976000"/>
+            <a:ext cx="11099160" cy="608760"/>
+          </a:xfrm>
+          <a:prstGeom prst="rect">
+            <a:avLst/>
+          </a:prstGeom>
+          <a:noFill/>
+          <a:ln>
+            <a:noFill/>
+          </a:ln>
+        </p:spPr>
+        <p:txBody>
+          <a:bodyPr lIns="90000" rIns="90000" tIns="45000" bIns="45000">
+            <a:spAutoFit/>
+          </a:bodyPr>
+          <a:p>
+            <a:r>
+              <a:rPr b="0" lang="en-GB" sz="1600" spc="-1" strike="noStrike">
+                <a:solidFill>
+                  <a:srgbClr val="7c007c"/>
+                </a:solidFill>
+                <a:latin typeface="Liberation Mono;Courier New;DejaVu Sans Mono"/>
+              </a:rPr>
+              <a:t>* hkl_info.type: interaction type of event 't'=Transmit, 'i'=Incoherent, 'c'=Coherent</a:t>
+            </a:r>
+            <a:endParaRPr b="0" lang="en-GB" sz="1600" spc="-1" strike="noStrike">
+              <a:solidFill>
+                <a:srgbClr val="7c007c"/>
+              </a:solidFill>
+              <a:latin typeface="Liberation Mono;Courier New;DejaVu Sans Mono"/>
+              <a:ea typeface="Liberation Mono;Courier New;DejaVu Sans Mono"/>
+            </a:endParaRPr>
+          </a:p>
+        </p:txBody>
+      </p:sp>
+      <p:sp>
+        <p:nvSpPr>
+          <p:cNvPr id="273" name="TextShape 5"/>
+          <p:cNvSpPr txBox="1"/>
+          <p:nvPr/>
+        </p:nvSpPr>
+        <p:spPr>
+          <a:xfrm>
+            <a:off x="1440000" y="5609520"/>
+            <a:ext cx="1944000" cy="366480"/>
+          </a:xfrm>
+          <a:prstGeom prst="rect">
+            <a:avLst/>
+          </a:prstGeom>
+          <a:noFill/>
+          <a:ln>
+            <a:noFill/>
+          </a:ln>
+        </p:spPr>
+        <p:txBody>
+          <a:bodyPr lIns="90000" rIns="90000" tIns="45000" bIns="45000">
+            <a:spAutoFit/>
+          </a:bodyPr>
+          <a:p>
+            <a:r>
+              <a:rPr b="0" lang="en-GB" sz="1800" spc="-1" strike="noStrike">
+                <a:latin typeface="Arial"/>
+              </a:rPr>
+              <a:t>From </a:t>
+            </a:r>
+            <a:r>
+              <a:rPr b="1" lang="en-GB" sz="1800" spc="-1" strike="noStrike">
+                <a:latin typeface="Courier New"/>
+              </a:rPr>
+              <a:t>mcdoc:</a:t>
             </a:r>
             <a:endParaRPr b="0" lang="en-GB" sz="1800" spc="-1" strike="noStrike">
               <a:latin typeface="Arial"/>
@@ -19607,7 +19733,7 @@
       </p:grpSpPr>
       <p:sp>
         <p:nvSpPr>
-          <p:cNvPr id="272" name="CustomShape 1"/>
+          <p:cNvPr id="274" name="CustomShape 1"/>
           <p:cNvSpPr/>
           <p:nvPr/>
         </p:nvSpPr>
@@ -19658,7 +19784,7 @@
       </p:sp>
       <p:sp>
         <p:nvSpPr>
-          <p:cNvPr id="273" name="CustomShape 2"/>
+          <p:cNvPr id="275" name="CustomShape 2"/>
           <p:cNvSpPr/>
           <p:nvPr/>
         </p:nvSpPr>
@@ -19964,7 +20090,7 @@
       </p:sp>
       <p:sp>
         <p:nvSpPr>
-          <p:cNvPr id="274" name="CustomShape 3"/>
+          <p:cNvPr id="276" name="CustomShape 3"/>
           <p:cNvSpPr/>
           <p:nvPr/>
         </p:nvSpPr>

</xml_diff>